<commit_message>
- Adicionado uma tela explicando coroutine
</commit_message>
<xml_diff>
--- a/miniprojeto2/Navetângulo.pptx
+++ b/miniprojeto2/Navetângulo.pptx
@@ -3411,6 +3411,46 @@
           </a:prstGeom>
         </p:spPr>
       </p:pic>
+      <p:sp>
+        <p:nvSpPr>
+          <p:cNvPr id="7" name="Oval 6"/>
+          <p:cNvSpPr/>
+          <p:nvPr/>
+        </p:nvSpPr>
+        <p:spPr>
+          <a:xfrm>
+            <a:off x="6293224" y="2501153"/>
+            <a:ext cx="3617258" cy="2339788"/>
+          </a:xfrm>
+          <a:prstGeom prst="ellipse">
+            <a:avLst/>
+          </a:prstGeom>
+          <a:noFill/>
+          <a:ln w="38100"/>
+        </p:spPr>
+        <p:style>
+          <a:lnRef idx="2">
+            <a:schemeClr val="accent6"/>
+          </a:lnRef>
+          <a:fillRef idx="1">
+            <a:schemeClr val="lt1"/>
+          </a:fillRef>
+          <a:effectRef idx="0">
+            <a:schemeClr val="accent6"/>
+          </a:effectRef>
+          <a:fontRef idx="minor">
+            <a:schemeClr val="dk1"/>
+          </a:fontRef>
+        </p:style>
+        <p:txBody>
+          <a:bodyPr rtlCol="0" anchor="ctr"/>
+          <a:lstStyle/>
+          <a:p>
+            <a:pPr algn="ctr"/>
+            <a:endParaRPr lang="pt-BR"/>
+          </a:p>
+        </p:txBody>
+      </p:sp>
     </p:spTree>
     <p:extLst>
       <p:ext uri="{BB962C8B-B14F-4D97-AF65-F5344CB8AC3E}">

</xml_diff>